<commit_message>
Update IES21_Tesis Encabo-Arguello Final.pptx
</commit_message>
<xml_diff>
--- a/IES21_Tesis Encabo-Arguello Final.pptx
+++ b/IES21_Tesis Encabo-Arguello Final.pptx
@@ -290,7 +290,7 @@
               <a:pPr>
                 <a:defRPr/>
               </a:pPr>
-              <a:t>8/29/2024</a:t>
+              <a:t>9/2/2024</a:t>
             </a:fld>
             <a:endParaRPr lang="en-US"/>
           </a:p>
@@ -1303,7 +1303,7 @@
               <a:pPr>
                 <a:defRPr/>
               </a:pPr>
-              <a:t>8/29/2024</a:t>
+              <a:t>9/2/2024</a:t>
             </a:fld>
             <a:endParaRPr lang="en-US"/>
           </a:p>
@@ -1516,7 +1516,7 @@
               <a:pPr>
                 <a:defRPr/>
               </a:pPr>
-              <a:t>8/29/2024</a:t>
+              <a:t>9/2/2024</a:t>
             </a:fld>
             <a:endParaRPr lang="en-US"/>
           </a:p>
@@ -1739,7 +1739,7 @@
               <a:pPr>
                 <a:defRPr/>
               </a:pPr>
-              <a:t>8/29/2024</a:t>
+              <a:t>9/2/2024</a:t>
             </a:fld>
             <a:endParaRPr lang="en-US"/>
           </a:p>
@@ -1952,7 +1952,7 @@
               <a:pPr>
                 <a:defRPr/>
               </a:pPr>
-              <a:t>8/29/2024</a:t>
+              <a:t>9/2/2024</a:t>
             </a:fld>
             <a:endParaRPr lang="en-US"/>
           </a:p>
@@ -2242,7 +2242,7 @@
               <a:pPr>
                 <a:defRPr/>
               </a:pPr>
-              <a:t>8/29/2024</a:t>
+              <a:t>9/2/2024</a:t>
             </a:fld>
             <a:endParaRPr lang="en-US"/>
           </a:p>
@@ -2572,7 +2572,7 @@
               <a:pPr>
                 <a:defRPr/>
               </a:pPr>
-              <a:t>8/29/2024</a:t>
+              <a:t>9/2/2024</a:t>
             </a:fld>
             <a:endParaRPr lang="en-US"/>
           </a:p>
@@ -3036,7 +3036,7 @@
               <a:pPr>
                 <a:defRPr/>
               </a:pPr>
-              <a:t>8/29/2024</a:t>
+              <a:t>9/2/2024</a:t>
             </a:fld>
             <a:endParaRPr lang="en-US"/>
           </a:p>
@@ -3198,7 +3198,7 @@
               <a:pPr>
                 <a:defRPr/>
               </a:pPr>
-              <a:t>8/29/2024</a:t>
+              <a:t>9/2/2024</a:t>
             </a:fld>
             <a:endParaRPr lang="en-US"/>
           </a:p>
@@ -3338,7 +3338,7 @@
               <a:pPr>
                 <a:defRPr/>
               </a:pPr>
-              <a:t>8/29/2024</a:t>
+              <a:t>9/2/2024</a:t>
             </a:fld>
             <a:endParaRPr lang="en-US"/>
           </a:p>
@@ -3658,7 +3658,7 @@
               <a:pPr>
                 <a:defRPr/>
               </a:pPr>
-              <a:t>8/29/2024</a:t>
+              <a:t>9/2/2024</a:t>
             </a:fld>
             <a:endParaRPr lang="en-US"/>
           </a:p>
@@ -3958,7 +3958,7 @@
               <a:pPr>
                 <a:defRPr/>
               </a:pPr>
-              <a:t>8/29/2024</a:t>
+              <a:t>9/2/2024</a:t>
             </a:fld>
             <a:endParaRPr lang="en-US"/>
           </a:p>
@@ -4287,7 +4287,7 @@
               <a:pPr>
                 <a:defRPr/>
               </a:pPr>
-              <a:t>8/29/2024</a:t>
+              <a:t>9/2/2024</a:t>
             </a:fld>
             <a:endParaRPr lang="en-US"/>
           </a:p>
@@ -5867,7 +5867,7 @@
         </p:blipFill>
         <p:spPr>
           <a:xfrm>
-            <a:off x="2448176" y="1505890"/>
+            <a:off x="2495600" y="1516645"/>
             <a:ext cx="504000" cy="478081"/>
           </a:xfrm>
           <a:prstGeom prst="rect">
@@ -6098,7 +6098,7 @@
         </p:nvSpPr>
         <p:spPr bwMode="auto">
           <a:xfrm>
-            <a:off x="3193438" y="2215033"/>
+            <a:off x="3193438" y="2111390"/>
             <a:ext cx="2797369" cy="707886"/>
           </a:xfrm>
           <a:prstGeom prst="rect">
@@ -6305,7 +6305,7 @@
         </p:nvSpPr>
         <p:spPr bwMode="auto">
           <a:xfrm>
-            <a:off x="3193438" y="2854785"/>
+            <a:off x="3193438" y="2818834"/>
             <a:ext cx="3328668" cy="707886"/>
           </a:xfrm>
           <a:prstGeom prst="rect">
@@ -6512,7 +6512,7 @@
         </p:nvSpPr>
         <p:spPr bwMode="auto">
           <a:xfrm>
-            <a:off x="3193438" y="4259635"/>
+            <a:off x="3193438" y="4233722"/>
             <a:ext cx="3856953" cy="707886"/>
           </a:xfrm>
           <a:prstGeom prst="rect">
@@ -6719,7 +6719,7 @@
         </p:nvSpPr>
         <p:spPr bwMode="auto">
           <a:xfrm>
-            <a:off x="3193438" y="3551749"/>
+            <a:off x="3193438" y="3526278"/>
             <a:ext cx="3697679" cy="707886"/>
           </a:xfrm>
           <a:prstGeom prst="rect">
@@ -7146,7 +7146,7 @@
         </p:blipFill>
         <p:spPr>
           <a:xfrm flipH="1">
-            <a:off x="2448176" y="2956728"/>
+            <a:off x="2495600" y="2920777"/>
             <a:ext cx="504000" cy="504000"/>
           </a:xfrm>
           <a:prstGeom prst="rect">
@@ -7393,7 +7393,7 @@
                   </a:outerShdw>
                 </a:effectLst>
               </a:rPr>
-              <a:t>Juan Pablo &amp; Marcelo </a:t>
+              <a:t>Marcelo &amp; Juan Pablo </a:t>
             </a:r>
           </a:p>
         </p:txBody>
@@ -7427,8 +7427,8 @@
         </p:blipFill>
         <p:spPr>
           <a:xfrm>
-            <a:off x="2448176" y="5043111"/>
-            <a:ext cx="504000" cy="504000"/>
+            <a:off x="2420078" y="4967589"/>
+            <a:ext cx="655044" cy="655044"/>
           </a:xfrm>
           <a:prstGeom prst="rect">
             <a:avLst/>
@@ -7464,7 +7464,7 @@
         </p:blipFill>
         <p:spPr>
           <a:xfrm>
-            <a:off x="2448176" y="2292538"/>
+            <a:off x="2495600" y="2210628"/>
             <a:ext cx="504000" cy="504000"/>
           </a:xfrm>
           <a:prstGeom prst="rect">
@@ -7501,7 +7501,7 @@
         </p:blipFill>
         <p:spPr>
           <a:xfrm>
-            <a:off x="2448176" y="3670791"/>
+            <a:off x="2495600" y="3623471"/>
             <a:ext cx="504000" cy="504000"/>
           </a:xfrm>
           <a:prstGeom prst="rect">
@@ -7538,7 +7538,7 @@
         </p:blipFill>
         <p:spPr>
           <a:xfrm>
-            <a:off x="2448176" y="4384854"/>
+            <a:off x="2495600" y="4326165"/>
             <a:ext cx="504000" cy="504000"/>
           </a:xfrm>
           <a:prstGeom prst="rect">
@@ -7556,13 +7556,13 @@
   <p:clrMapOvr>
     <a:masterClrMapping/>
   </p:clrMapOvr>
-  <mc:AlternateContent xmlns:mc="http://schemas.openxmlformats.org/markup-compatibility/2006">
-    <mc:Choice xmlns:p14="http://schemas.microsoft.com/office/powerpoint/2010/main" Requires="p14">
+  <mc:AlternateContent xmlns:mc="http://schemas.openxmlformats.org/markup-compatibility/2006" xmlns:p14="http://schemas.microsoft.com/office/powerpoint/2010/main">
+    <mc:Choice Requires="p14">
       <p:transition spd="slow" p14:dur="1500">
         <p:split orient="vert"/>
       </p:transition>
     </mc:Choice>
-    <mc:Fallback>
+    <mc:Fallback xmlns="">
       <p:transition spd="slow">
         <p:split orient="vert"/>
       </p:transition>
@@ -9419,13 +9419,13 @@
   <p:clrMapOvr>
     <a:masterClrMapping/>
   </p:clrMapOvr>
-  <mc:AlternateContent xmlns:mc="http://schemas.openxmlformats.org/markup-compatibility/2006">
-    <mc:Choice xmlns:p159="http://schemas.microsoft.com/office/powerpoint/2015/09/main" Requires="p159">
+  <mc:AlternateContent xmlns:mc="http://schemas.openxmlformats.org/markup-compatibility/2006" xmlns:p159="http://schemas.microsoft.com/office/powerpoint/2015/09/main">
+    <mc:Choice Requires="p159">
       <p:transition xmlns:p14="http://schemas.microsoft.com/office/powerpoint/2010/main" spd="slow" p14:dur="2000">
         <p159:morph option="byObject"/>
       </p:transition>
     </mc:Choice>
-    <mc:Fallback>
+    <mc:Fallback xmlns="">
       <p:transition spd="slow">
         <p:fade/>
       </p:transition>
@@ -13931,13 +13931,13 @@
   <p:clrMapOvr>
     <a:masterClrMapping/>
   </p:clrMapOvr>
-  <mc:AlternateContent xmlns:mc="http://schemas.openxmlformats.org/markup-compatibility/2006">
-    <mc:Choice xmlns:p159="http://schemas.microsoft.com/office/powerpoint/2015/09/main" Requires="p159">
+  <mc:AlternateContent xmlns:mc="http://schemas.openxmlformats.org/markup-compatibility/2006" xmlns:p159="http://schemas.microsoft.com/office/powerpoint/2015/09/main">
+    <mc:Choice Requires="p159">
       <p:transition xmlns:p14="http://schemas.microsoft.com/office/powerpoint/2010/main" spd="slow" p14:dur="2000">
         <p159:morph option="byObject"/>
       </p:transition>
     </mc:Choice>
-    <mc:Fallback>
+    <mc:Fallback xmlns="">
       <p:transition spd="slow">
         <p:fade/>
       </p:transition>
@@ -17354,13 +17354,13 @@
   <p:clrMapOvr>
     <a:masterClrMapping/>
   </p:clrMapOvr>
-  <mc:AlternateContent xmlns:mc="http://schemas.openxmlformats.org/markup-compatibility/2006">
-    <mc:Choice xmlns:p159="http://schemas.microsoft.com/office/powerpoint/2015/09/main" Requires="p159">
+  <mc:AlternateContent xmlns:mc="http://schemas.openxmlformats.org/markup-compatibility/2006" xmlns:p159="http://schemas.microsoft.com/office/powerpoint/2015/09/main">
+    <mc:Choice Requires="p159">
       <p:transition xmlns:p14="http://schemas.microsoft.com/office/powerpoint/2010/main" spd="slow" p14:dur="2000">
         <p159:morph option="byObject"/>
       </p:transition>
     </mc:Choice>
-    <mc:Fallback>
+    <mc:Fallback xmlns="">
       <p:transition spd="slow">
         <p:fade/>
       </p:transition>
@@ -19026,8 +19026,8 @@
         </p:nvSpPr>
         <p:spPr>
           <a:xfrm>
-            <a:off x="8782590" y="3332095"/>
-            <a:ext cx="2939761" cy="1231106"/>
+            <a:off x="8758938" y="3366958"/>
+            <a:ext cx="2939761" cy="1107996"/>
           </a:xfrm>
           <a:prstGeom prst="rect">
             <a:avLst/>
@@ -19058,29 +19058,17 @@
               <a:defRPr/>
             </a:pPr>
             <a:r>
-              <a:rPr lang="es-ES" sz="1600" dirty="0">
+              <a:rPr lang="es-ES" sz="1200" dirty="0">
                 <a:solidFill>
-                  <a:schemeClr val="bg1"/>
+                  <a:schemeClr val="bg1">
+                    <a:lumMod val="75000"/>
+                  </a:schemeClr>
                 </a:solidFill>
-                <a:latin typeface="UniSansBook" panose="00000500000000000000" pitchFamily="2" charset="0"/>
+                <a:latin typeface="Aptos Display" panose="020B0004020202020204" pitchFamily="34" charset="0"/>
                 <a:cs typeface="+mn-cs"/>
               </a:rPr>
-              <a:t>Tecnificar el área </a:t>
+              <a:t>Tecnificar el área</a:t>
             </a:r>
-            <a:endParaRPr kumimoji="0" lang="es-ES" sz="1600" b="0" i="0" u="none" strike="noStrike" kern="1200" cap="none" spc="0" normalizeH="0" baseline="0" noProof="0" dirty="0">
-              <a:ln>
-                <a:noFill/>
-              </a:ln>
-              <a:solidFill>
-                <a:schemeClr val="bg1"/>
-              </a:solidFill>
-              <a:effectLst/>
-              <a:uLnTx/>
-              <a:uFillTx/>
-              <a:latin typeface="UniSansBook" panose="00000500000000000000" pitchFamily="2" charset="0"/>
-              <a:ea typeface="+mn-ea"/>
-              <a:cs typeface="+mn-cs"/>
-            </a:endParaRPr>
           </a:p>
           <a:p>
             <a:pPr marL="0" marR="0" lvl="0" indent="0" defTabSz="914400" rtl="0" eaLnBrk="1" fontAlgn="auto" latinLnBrk="0" hangingPunct="1">
@@ -19101,69 +19089,13 @@
               <a:defRPr/>
             </a:pPr>
             <a:r>
-              <a:rPr lang="es-ES" sz="1600" dirty="0">
+              <a:rPr lang="es-ES" sz="300" dirty="0">
                 <a:solidFill>
-                  <a:schemeClr val="bg1"/>
+                  <a:schemeClr val="bg1">
+                    <a:lumMod val="75000"/>
+                  </a:schemeClr>
                 </a:solidFill>
-                <a:latin typeface="UniSansBook" panose="00000500000000000000" pitchFamily="2" charset="0"/>
-              </a:rPr>
-              <a:t>Acceso Via Web </a:t>
-            </a:r>
-            <a:endParaRPr kumimoji="0" lang="es-ES" sz="1600" b="0" i="0" u="none" strike="noStrike" kern="1200" cap="none" spc="0" normalizeH="0" baseline="0" noProof="0" dirty="0">
-              <a:ln>
-                <a:noFill/>
-              </a:ln>
-              <a:solidFill>
-                <a:schemeClr val="bg1"/>
-              </a:solidFill>
-              <a:effectLst/>
-              <a:uLnTx/>
-              <a:uFillTx/>
-              <a:latin typeface="UniSansBook" panose="00000500000000000000" pitchFamily="2" charset="0"/>
-              <a:ea typeface="+mn-ea"/>
-              <a:cs typeface="+mn-cs"/>
-            </a:endParaRPr>
-          </a:p>
-          <a:p>
-            <a:pPr marL="0" marR="0" lvl="0" indent="0" defTabSz="914400" rtl="0" eaLnBrk="1" fontAlgn="auto" latinLnBrk="0" hangingPunct="1">
-              <a:lnSpc>
-                <a:spcPct val="100000"/>
-              </a:lnSpc>
-              <a:spcBef>
-                <a:spcPts val="0"/>
-              </a:spcBef>
-              <a:spcAft>
-                <a:spcPts val="0"/>
-              </a:spcAft>
-              <a:buClrTx/>
-              <a:buSzTx/>
-              <a:buFontTx/>
-              <a:buNone/>
-              <a:tabLst/>
-              <a:defRPr/>
-            </a:pPr>
-            <a:r>
-              <a:rPr lang="es-ES" sz="1600" dirty="0">
-                <a:solidFill>
-                  <a:schemeClr val="bg1"/>
-                </a:solidFill>
-                <a:latin typeface="UniSansBook" panose="00000500000000000000" pitchFamily="2" charset="0"/>
-              </a:rPr>
-              <a:t>Visualización ágil de Información </a:t>
-            </a:r>
-            <a:r>
-              <a:rPr kumimoji="0" lang="es-ES" sz="1600" b="0" i="0" u="none" strike="noStrike" kern="1200" cap="none" spc="0" normalizeH="0" baseline="0" noProof="0" dirty="0">
-                <a:ln>
-                  <a:noFill/>
-                </a:ln>
-                <a:solidFill>
-                  <a:schemeClr val="bg1"/>
-                </a:solidFill>
-                <a:effectLst/>
-                <a:uLnTx/>
-                <a:uFillTx/>
-                <a:latin typeface="UniSansBook" panose="00000500000000000000" pitchFamily="2" charset="0"/>
-                <a:ea typeface="+mn-ea"/>
+                <a:latin typeface="Aptos Display" panose="020B0004020202020204" pitchFamily="34" charset="0"/>
                 <a:cs typeface="+mn-cs"/>
               </a:rPr>
               <a:t> </a:t>
@@ -19188,18 +19120,134 @@
               <a:defRPr/>
             </a:pPr>
             <a:r>
-              <a:rPr kumimoji="0" lang="es-ES" sz="1600" b="0" i="0" u="none" strike="noStrike" kern="1200" cap="none" spc="0" normalizeH="0" baseline="0" noProof="0" dirty="0">
-                <a:ln>
-                  <a:noFill/>
-                </a:ln>
+              <a:rPr lang="es-ES" sz="1200" dirty="0">
                 <a:solidFill>
-                  <a:schemeClr val="bg1"/>
+                  <a:schemeClr val="bg1">
+                    <a:lumMod val="75000"/>
+                  </a:schemeClr>
                 </a:solidFill>
-                <a:effectLst/>
-                <a:uLnTx/>
-                <a:uFillTx/>
-                <a:latin typeface="UniSansBook" panose="00000500000000000000" pitchFamily="2" charset="0"/>
-                <a:ea typeface="+mn-ea"/>
+                <a:latin typeface="Aptos Display" panose="020B0004020202020204" pitchFamily="34" charset="0"/>
+                <a:cs typeface="+mn-cs"/>
+              </a:rPr>
+              <a:t>Acceso Via Web </a:t>
+            </a:r>
+          </a:p>
+          <a:p>
+            <a:pPr marL="0" marR="0" lvl="0" indent="0" defTabSz="914400" rtl="0" eaLnBrk="1" fontAlgn="auto" latinLnBrk="0" hangingPunct="1">
+              <a:lnSpc>
+                <a:spcPct val="100000"/>
+              </a:lnSpc>
+              <a:spcBef>
+                <a:spcPts val="0"/>
+              </a:spcBef>
+              <a:spcAft>
+                <a:spcPts val="0"/>
+              </a:spcAft>
+              <a:buClrTx/>
+              <a:buSzTx/>
+              <a:buFontTx/>
+              <a:buNone/>
+              <a:tabLst/>
+              <a:defRPr/>
+            </a:pPr>
+            <a:endParaRPr lang="es-ES" sz="300" dirty="0">
+              <a:solidFill>
+                <a:schemeClr val="bg1">
+                  <a:lumMod val="75000"/>
+                </a:schemeClr>
+              </a:solidFill>
+              <a:latin typeface="Aptos Display" panose="020B0004020202020204" pitchFamily="34" charset="0"/>
+              <a:cs typeface="+mn-cs"/>
+            </a:endParaRPr>
+          </a:p>
+          <a:p>
+            <a:pPr marL="0" marR="0" lvl="0" indent="0" defTabSz="914400" rtl="0" eaLnBrk="1" fontAlgn="auto" latinLnBrk="0" hangingPunct="1">
+              <a:lnSpc>
+                <a:spcPct val="100000"/>
+              </a:lnSpc>
+              <a:spcBef>
+                <a:spcPts val="0"/>
+              </a:spcBef>
+              <a:spcAft>
+                <a:spcPts val="0"/>
+              </a:spcAft>
+              <a:buClrTx/>
+              <a:buSzTx/>
+              <a:buFontTx/>
+              <a:buNone/>
+              <a:tabLst/>
+              <a:defRPr/>
+            </a:pPr>
+            <a:r>
+              <a:rPr lang="es-ES" sz="1200" dirty="0">
+                <a:solidFill>
+                  <a:schemeClr val="bg1">
+                    <a:lumMod val="75000"/>
+                  </a:schemeClr>
+                </a:solidFill>
+                <a:latin typeface="Aptos Display" panose="020B0004020202020204" pitchFamily="34" charset="0"/>
+                <a:cs typeface="+mn-cs"/>
+              </a:rPr>
+              <a:t>Visualización ágil de Información </a:t>
+            </a:r>
+          </a:p>
+          <a:p>
+            <a:pPr marL="0" marR="0" lvl="0" indent="0" defTabSz="914400" rtl="0" eaLnBrk="1" fontAlgn="auto" latinLnBrk="0" hangingPunct="1">
+              <a:lnSpc>
+                <a:spcPct val="100000"/>
+              </a:lnSpc>
+              <a:spcBef>
+                <a:spcPts val="0"/>
+              </a:spcBef>
+              <a:spcAft>
+                <a:spcPts val="0"/>
+              </a:spcAft>
+              <a:buClrTx/>
+              <a:buSzTx/>
+              <a:buFontTx/>
+              <a:buNone/>
+              <a:tabLst/>
+              <a:defRPr/>
+            </a:pPr>
+            <a:r>
+              <a:rPr lang="es-ES" sz="300" dirty="0">
+                <a:solidFill>
+                  <a:schemeClr val="bg1">
+                    <a:lumMod val="75000"/>
+                  </a:schemeClr>
+                </a:solidFill>
+                <a:latin typeface="Aptos Display" panose="020B0004020202020204" pitchFamily="34" charset="0"/>
+                <a:cs typeface="+mn-cs"/>
+              </a:rPr>
+              <a:t> </a:t>
+            </a:r>
+          </a:p>
+          <a:p>
+            <a:pPr marL="0" marR="0" lvl="0" indent="0" defTabSz="914400" rtl="0" eaLnBrk="1" fontAlgn="auto" latinLnBrk="0" hangingPunct="1">
+              <a:lnSpc>
+                <a:spcPct val="100000"/>
+              </a:lnSpc>
+              <a:spcBef>
+                <a:spcPts val="0"/>
+              </a:spcBef>
+              <a:spcAft>
+                <a:spcPts val="0"/>
+              </a:spcAft>
+              <a:buClrTx/>
+              <a:buSzTx/>
+              <a:buFontTx/>
+              <a:buNone/>
+              <a:tabLst/>
+              <a:defRPr/>
+            </a:pPr>
+            <a:r>
+              <a:rPr lang="es-ES" sz="1200" dirty="0">
+                <a:solidFill>
+                  <a:schemeClr val="bg1">
+                    <a:lumMod val="75000"/>
+                  </a:schemeClr>
+                </a:solidFill>
+                <a:latin typeface="Aptos Display" panose="020B0004020202020204" pitchFamily="34" charset="0"/>
                 <a:cs typeface="+mn-cs"/>
               </a:rPr>
               <a:t>Agilizar la carga de datos</a:t>
@@ -19223,29 +19271,46 @@
               <a:tabLst/>
               <a:defRPr/>
             </a:pPr>
+            <a:endParaRPr lang="es-ES" sz="300" dirty="0">
+              <a:solidFill>
+                <a:schemeClr val="bg1">
+                  <a:lumMod val="75000"/>
+                </a:schemeClr>
+              </a:solidFill>
+              <a:latin typeface="Aptos Display" panose="020B0004020202020204" pitchFamily="34" charset="0"/>
+              <a:cs typeface="+mn-cs"/>
+            </a:endParaRPr>
+          </a:p>
+          <a:p>
+            <a:pPr marL="0" marR="0" lvl="0" indent="0" defTabSz="914400" rtl="0" eaLnBrk="1" fontAlgn="auto" latinLnBrk="0" hangingPunct="1">
+              <a:lnSpc>
+                <a:spcPct val="100000"/>
+              </a:lnSpc>
+              <a:spcBef>
+                <a:spcPts val="0"/>
+              </a:spcBef>
+              <a:spcAft>
+                <a:spcPts val="0"/>
+              </a:spcAft>
+              <a:buClrTx/>
+              <a:buSzTx/>
+              <a:buFontTx/>
+              <a:buNone/>
+              <a:tabLst/>
+              <a:defRPr/>
+            </a:pPr>
             <a:r>
-              <a:rPr lang="es-ES" sz="1600" dirty="0">
+              <a:rPr lang="es-ES" sz="1200" dirty="0">
                 <a:solidFill>
-                  <a:schemeClr val="bg1"/>
+                  <a:schemeClr val="bg1">
+                    <a:lumMod val="75000"/>
+                  </a:schemeClr>
                 </a:solidFill>
-                <a:latin typeface="UniSansBook" panose="00000500000000000000" pitchFamily="2" charset="0"/>
+                <a:latin typeface="Aptos Display" panose="020B0004020202020204" pitchFamily="34" charset="0"/>
+                <a:cs typeface="+mn-cs"/>
               </a:rPr>
               <a:t>Gestionar información </a:t>
             </a:r>
-            <a:endParaRPr kumimoji="0" lang="es-ES" sz="1600" b="0" i="0" u="none" strike="noStrike" kern="1200" cap="none" spc="0" normalizeH="0" baseline="0" noProof="0" dirty="0">
-              <a:ln>
-                <a:noFill/>
-              </a:ln>
-              <a:solidFill>
-                <a:schemeClr val="bg1"/>
-              </a:solidFill>
-              <a:effectLst/>
-              <a:uLnTx/>
-              <a:uFillTx/>
-              <a:latin typeface="UniSansBook" panose="00000500000000000000" pitchFamily="2" charset="0"/>
-              <a:ea typeface="+mn-ea"/>
-              <a:cs typeface="+mn-cs"/>
-            </a:endParaRPr>
           </a:p>
         </p:txBody>
       </p:sp>
@@ -19265,6 +19330,13 @@
         </p:nvPicPr>
         <p:blipFill>
           <a:blip r:embed="rId10">
+            <a:duotone>
+              <a:schemeClr val="accent6">
+                <a:shade val="45000"/>
+                <a:satMod val="135000"/>
+              </a:schemeClr>
+              <a:prstClr val="white"/>
+            </a:duotone>
             <a:extLst>
               <a:ext uri="{28A0092B-C50C-407E-A947-70E740481C1C}">
                 <a14:useLocalDpi xmlns:a14="http://schemas.microsoft.com/office/drawing/2010/main" val="0"/>
@@ -19277,7 +19349,7 @@
         </p:blipFill>
         <p:spPr>
           <a:xfrm>
-            <a:off x="8505484" y="3418103"/>
+            <a:off x="8551509" y="3383430"/>
             <a:ext cx="176032" cy="176032"/>
           </a:xfrm>
           <a:prstGeom prst="rect">
@@ -19301,6 +19373,13 @@
         </p:nvPicPr>
         <p:blipFill>
           <a:blip r:embed="rId10">
+            <a:duotone>
+              <a:schemeClr val="accent6">
+                <a:shade val="45000"/>
+                <a:satMod val="135000"/>
+              </a:schemeClr>
+              <a:prstClr val="white"/>
+            </a:duotone>
             <a:extLst>
               <a:ext uri="{28A0092B-C50C-407E-A947-70E740481C1C}">
                 <a14:useLocalDpi xmlns:a14="http://schemas.microsoft.com/office/drawing/2010/main" val="0"/>
@@ -19313,7 +19392,7 @@
         </p:blipFill>
         <p:spPr>
           <a:xfrm>
-            <a:off x="8505484" y="3664898"/>
+            <a:off x="8551509" y="3624943"/>
             <a:ext cx="176032" cy="176032"/>
           </a:xfrm>
           <a:prstGeom prst="rect">
@@ -19337,6 +19416,13 @@
         </p:nvPicPr>
         <p:blipFill>
           <a:blip r:embed="rId10">
+            <a:duotone>
+              <a:schemeClr val="accent6">
+                <a:shade val="45000"/>
+                <a:satMod val="135000"/>
+              </a:schemeClr>
+              <a:prstClr val="white"/>
+            </a:duotone>
             <a:extLst>
               <a:ext uri="{28A0092B-C50C-407E-A947-70E740481C1C}">
                 <a14:useLocalDpi xmlns:a14="http://schemas.microsoft.com/office/drawing/2010/main" val="0"/>
@@ -19349,7 +19435,7 @@
         </p:blipFill>
         <p:spPr>
           <a:xfrm>
-            <a:off x="8505484" y="3911693"/>
+            <a:off x="8551509" y="3850529"/>
             <a:ext cx="176032" cy="176032"/>
           </a:xfrm>
           <a:prstGeom prst="rect">
@@ -19373,6 +19459,13 @@
         </p:nvPicPr>
         <p:blipFill>
           <a:blip r:embed="rId10">
+            <a:duotone>
+              <a:schemeClr val="accent6">
+                <a:shade val="45000"/>
+                <a:satMod val="135000"/>
+              </a:schemeClr>
+              <a:prstClr val="white"/>
+            </a:duotone>
             <a:extLst>
               <a:ext uri="{28A0092B-C50C-407E-A947-70E740481C1C}">
                 <a14:useLocalDpi xmlns:a14="http://schemas.microsoft.com/office/drawing/2010/main" val="0"/>
@@ -19385,7 +19478,7 @@
         </p:blipFill>
         <p:spPr>
           <a:xfrm>
-            <a:off x="8505484" y="4149431"/>
+            <a:off x="8551509" y="4069561"/>
             <a:ext cx="176032" cy="176032"/>
           </a:xfrm>
           <a:prstGeom prst="rect">
@@ -19409,6 +19502,13 @@
         </p:nvPicPr>
         <p:blipFill>
           <a:blip r:embed="rId10">
+            <a:duotone>
+              <a:schemeClr val="accent6">
+                <a:shade val="45000"/>
+                <a:satMod val="135000"/>
+              </a:schemeClr>
+              <a:prstClr val="white"/>
+            </a:duotone>
             <a:extLst>
               <a:ext uri="{28A0092B-C50C-407E-A947-70E740481C1C}">
                 <a14:useLocalDpi xmlns:a14="http://schemas.microsoft.com/office/drawing/2010/main" val="0"/>
@@ -19421,7 +19521,7 @@
         </p:blipFill>
         <p:spPr>
           <a:xfrm>
-            <a:off x="8505484" y="4387169"/>
+            <a:off x="8551509" y="4298922"/>
             <a:ext cx="176032" cy="176032"/>
           </a:xfrm>
           <a:prstGeom prst="rect">
@@ -19532,7 +19632,7 @@
         </p:nvGrpSpPr>
         <p:grpSpPr>
           <a:xfrm>
-            <a:off x="493301" y="3237789"/>
+            <a:off x="471228" y="3237789"/>
             <a:ext cx="124026" cy="1800000"/>
             <a:chOff x="5888584" y="1588485"/>
             <a:chExt cx="95475" cy="1146221"/>
@@ -19561,7 +19661,9 @@
             <a:prstGeom prst="rect">
               <a:avLst/>
             </a:prstGeom>
-            <a:grpFill/>
+            <a:solidFill>
+              <a:srgbClr val="918F88"/>
+            </a:solidFill>
             <a:ln>
               <a:noFill/>
             </a:ln>
@@ -19615,7 +19717,9 @@
             <a:prstGeom prst="triangle">
               <a:avLst/>
             </a:prstGeom>
-            <a:grpFill/>
+            <a:solidFill>
+              <a:srgbClr val="918F88"/>
+            </a:solidFill>
             <a:ln>
               <a:noFill/>
             </a:ln>
@@ -19694,7 +19798,7 @@
               <a:avLst/>
             </a:prstGeom>
             <a:solidFill>
-              <a:srgbClr val="009640"/>
+              <a:srgbClr val="6B8339"/>
             </a:solidFill>
             <a:ln>
               <a:noFill/>
@@ -19721,7 +19825,7 @@
             <a:lstStyle/>
             <a:p>
               <a:pPr algn="ctr"/>
-              <a:endParaRPr lang="en-US">
+              <a:endParaRPr lang="en-US" dirty="0">
                 <a:solidFill>
                   <a:schemeClr val="bg1"/>
                 </a:solidFill>
@@ -19750,7 +19854,7 @@
               <a:avLst/>
             </a:prstGeom>
             <a:solidFill>
-              <a:srgbClr val="009640"/>
+              <a:srgbClr val="6B8339"/>
             </a:solidFill>
             <a:ln>
               <a:noFill/>
@@ -20072,7 +20176,13 @@
           </p:nvPicPr>
           <p:blipFill rotWithShape="1">
             <a:blip r:embed="rId14">
-              <a:lum bright="70000" contrast="-70000"/>
+              <a:duotone>
+                <a:schemeClr val="accent3">
+                  <a:shade val="45000"/>
+                  <a:satMod val="135000"/>
+                </a:schemeClr>
+                <a:prstClr val="white"/>
+              </a:duotone>
               <a:extLst>
                 <a:ext uri="{28A0092B-C50C-407E-A947-70E740481C1C}">
                   <a14:useLocalDpi xmlns:a14="http://schemas.microsoft.com/office/drawing/2010/main" val="0"/>
@@ -20178,10 +20288,10 @@
         </p:nvGrpSpPr>
         <p:grpSpPr>
           <a:xfrm>
-            <a:off x="8097152" y="3237789"/>
-            <a:ext cx="151734" cy="1800000"/>
+            <a:off x="8097180" y="3237789"/>
+            <a:ext cx="121086" cy="1800000"/>
             <a:chOff x="5888584" y="1588486"/>
-            <a:chExt cx="116804" cy="1146221"/>
+            <a:chExt cx="93211" cy="1146221"/>
           </a:xfrm>
           <a:solidFill>
             <a:srgbClr val="FFFF00"/>
@@ -20189,10 +20299,10 @@
         </p:grpSpPr>
         <p:sp>
           <p:nvSpPr>
-            <p:cNvPr id="43" name="Rectangle 1376">
+            <p:cNvPr id="44" name="Isosceles Triangle 1378">
               <a:extLst>
                 <a:ext uri="{FF2B5EF4-FFF2-40B4-BE49-F238E27FC236}">
-                  <a16:creationId xmlns:a16="http://schemas.microsoft.com/office/drawing/2014/main" id="{B7DAC1C1-E002-43F9-B09C-A05F7B133ECC}"/>
+                  <a16:creationId xmlns:a16="http://schemas.microsoft.com/office/drawing/2014/main" id="{1432B7C3-0CB0-4DA6-F03A-0C4EF9A953F1}"/>
                 </a:ext>
               </a:extLst>
             </p:cNvPr>
@@ -20200,14 +20310,16 @@
             <p:nvPr/>
           </p:nvSpPr>
           <p:spPr>
-            <a:xfrm>
-              <a:off x="5888584" y="1588486"/>
-              <a:ext cx="35195" cy="1146221"/>
+            <a:xfrm rot="5400000">
+              <a:off x="5882786" y="2587871"/>
+              <a:ext cx="116410" cy="81609"/>
             </a:xfrm>
-            <a:prstGeom prst="rect">
+            <a:prstGeom prst="triangle">
               <a:avLst/>
             </a:prstGeom>
-            <a:grpFill/>
+            <a:solidFill>
+              <a:srgbClr val="BE671F"/>
+            </a:solidFill>
             <a:ln>
               <a:noFill/>
             </a:ln>
@@ -20243,10 +20355,10 @@
         </p:sp>
         <p:sp>
           <p:nvSpPr>
-            <p:cNvPr id="44" name="Isosceles Triangle 1378">
+            <p:cNvPr id="43" name="Rectangle 1376">
               <a:extLst>
                 <a:ext uri="{FF2B5EF4-FFF2-40B4-BE49-F238E27FC236}">
-                  <a16:creationId xmlns:a16="http://schemas.microsoft.com/office/drawing/2014/main" id="{1432B7C3-0CB0-4DA6-F03A-0C4EF9A953F1}"/>
+                  <a16:creationId xmlns:a16="http://schemas.microsoft.com/office/drawing/2014/main" id="{B7DAC1C1-E002-43F9-B09C-A05F7B133ECC}"/>
                 </a:ext>
               </a:extLst>
             </p:cNvPr>
@@ -20254,14 +20366,16 @@
             <p:nvPr/>
           </p:nvSpPr>
           <p:spPr>
-            <a:xfrm rot="5400000">
-              <a:off x="5906379" y="2587871"/>
-              <a:ext cx="116410" cy="81609"/>
+            <a:xfrm>
+              <a:off x="5888584" y="1588486"/>
+              <a:ext cx="35195" cy="1146221"/>
             </a:xfrm>
-            <a:prstGeom prst="triangle">
+            <a:prstGeom prst="rect">
               <a:avLst/>
             </a:prstGeom>
-            <a:grpFill/>
+            <a:solidFill>
+              <a:srgbClr val="BE671F"/>
+            </a:solidFill>
             <a:ln>
               <a:noFill/>
             </a:ln>
@@ -21076,7 +21190,13 @@
           </p:nvPicPr>
           <p:blipFill rotWithShape="1">
             <a:blip r:embed="rId14">
-              <a:lum bright="70000" contrast="-70000"/>
+              <a:duotone>
+                <a:schemeClr val="accent3">
+                  <a:shade val="45000"/>
+                  <a:satMod val="135000"/>
+                </a:schemeClr>
+                <a:prstClr val="white"/>
+              </a:duotone>
               <a:extLst>
                 <a:ext uri="{28A0092B-C50C-407E-A947-70E740481C1C}">
                   <a14:useLocalDpi xmlns:a14="http://schemas.microsoft.com/office/drawing/2010/main" val="0"/>
@@ -21187,7 +21307,13 @@
           </p:nvPicPr>
           <p:blipFill rotWithShape="1">
             <a:blip r:embed="rId14">
-              <a:lum bright="70000" contrast="-70000"/>
+              <a:duotone>
+                <a:schemeClr val="accent3">
+                  <a:shade val="45000"/>
+                  <a:satMod val="135000"/>
+                </a:schemeClr>
+                <a:prstClr val="white"/>
+              </a:duotone>
               <a:extLst>
                 <a:ext uri="{28A0092B-C50C-407E-A947-70E740481C1C}">
                   <a14:useLocalDpi xmlns:a14="http://schemas.microsoft.com/office/drawing/2010/main" val="0"/>
@@ -21298,7 +21424,13 @@
           </p:nvPicPr>
           <p:blipFill rotWithShape="1">
             <a:blip r:embed="rId14">
-              <a:lum bright="70000" contrast="-70000"/>
+              <a:duotone>
+                <a:schemeClr val="accent3">
+                  <a:shade val="45000"/>
+                  <a:satMod val="135000"/>
+                </a:schemeClr>
+                <a:prstClr val="white"/>
+              </a:duotone>
               <a:extLst>
                 <a:ext uri="{28A0092B-C50C-407E-A947-70E740481C1C}">
                   <a14:useLocalDpi xmlns:a14="http://schemas.microsoft.com/office/drawing/2010/main" val="0"/>
@@ -21329,13 +21461,13 @@
   <p:clrMapOvr>
     <a:masterClrMapping/>
   </p:clrMapOvr>
-  <mc:AlternateContent xmlns:mc="http://schemas.openxmlformats.org/markup-compatibility/2006">
-    <mc:Choice xmlns:p159="http://schemas.microsoft.com/office/powerpoint/2015/09/main" Requires="p159">
+  <mc:AlternateContent xmlns:mc="http://schemas.openxmlformats.org/markup-compatibility/2006" xmlns:p159="http://schemas.microsoft.com/office/powerpoint/2015/09/main">
+    <mc:Choice Requires="p159">
       <p:transition xmlns:p14="http://schemas.microsoft.com/office/powerpoint/2010/main" spd="slow" p14:dur="2000">
         <p159:morph option="byObject"/>
       </p:transition>
     </mc:Choice>
-    <mc:Fallback>
+    <mc:Fallback xmlns="">
       <p:transition spd="slow">
         <p:fade/>
       </p:transition>
@@ -23940,13 +24072,13 @@
   <p:clrMapOvr>
     <a:masterClrMapping/>
   </p:clrMapOvr>
-  <mc:AlternateContent xmlns:mc="http://schemas.openxmlformats.org/markup-compatibility/2006">
-    <mc:Choice xmlns:p159="http://schemas.microsoft.com/office/powerpoint/2015/09/main" Requires="p159">
+  <mc:AlternateContent xmlns:mc="http://schemas.openxmlformats.org/markup-compatibility/2006" xmlns:p159="http://schemas.microsoft.com/office/powerpoint/2015/09/main">
+    <mc:Choice Requires="p159">
       <p:transition xmlns:p14="http://schemas.microsoft.com/office/powerpoint/2010/main" spd="slow" p14:dur="2000">
         <p159:morph option="byObject"/>
       </p:transition>
     </mc:Choice>
-    <mc:Fallback>
+    <mc:Fallback xmlns="">
       <p:transition spd="slow">
         <p:fade/>
       </p:transition>
@@ -27618,13 +27750,13 @@
   <p:clrMapOvr>
     <a:masterClrMapping/>
   </p:clrMapOvr>
-  <mc:AlternateContent xmlns:mc="http://schemas.openxmlformats.org/markup-compatibility/2006">
-    <mc:Choice xmlns:p159="http://schemas.microsoft.com/office/powerpoint/2015/09/main" Requires="p159">
+  <mc:AlternateContent xmlns:mc="http://schemas.openxmlformats.org/markup-compatibility/2006" xmlns:p159="http://schemas.microsoft.com/office/powerpoint/2015/09/main">
+    <mc:Choice Requires="p159">
       <p:transition xmlns:p14="http://schemas.microsoft.com/office/powerpoint/2010/main" spd="slow" p14:dur="2000">
         <p159:morph option="byObject"/>
       </p:transition>
     </mc:Choice>
-    <mc:Fallback>
+    <mc:Fallback xmlns="">
       <p:transition spd="slow">
         <p:fade/>
       </p:transition>
@@ -30931,13 +31063,13 @@
   <p:clrMapOvr>
     <a:masterClrMapping/>
   </p:clrMapOvr>
-  <mc:AlternateContent xmlns:mc="http://schemas.openxmlformats.org/markup-compatibility/2006">
-    <mc:Choice xmlns:p159="http://schemas.microsoft.com/office/powerpoint/2015/09/main" Requires="p159">
+  <mc:AlternateContent xmlns:mc="http://schemas.openxmlformats.org/markup-compatibility/2006" xmlns:p159="http://schemas.microsoft.com/office/powerpoint/2015/09/main">
+    <mc:Choice Requires="p159">
       <p:transition xmlns:p14="http://schemas.microsoft.com/office/powerpoint/2010/main" spd="slow" p14:dur="2000">
         <p159:morph option="byObject"/>
       </p:transition>
     </mc:Choice>
-    <mc:Fallback>
+    <mc:Fallback xmlns="">
       <p:transition spd="slow">
         <p:fade/>
       </p:transition>
@@ -32749,13 +32881,13 @@
   <p:clrMapOvr>
     <a:masterClrMapping/>
   </p:clrMapOvr>
-  <mc:AlternateContent xmlns:mc="http://schemas.openxmlformats.org/markup-compatibility/2006">
-    <mc:Choice xmlns:p159="http://schemas.microsoft.com/office/powerpoint/2015/09/main" Requires="p159">
+  <mc:AlternateContent xmlns:mc="http://schemas.openxmlformats.org/markup-compatibility/2006" xmlns:p159="http://schemas.microsoft.com/office/powerpoint/2015/09/main">
+    <mc:Choice Requires="p159">
       <p:transition xmlns:p14="http://schemas.microsoft.com/office/powerpoint/2010/main" spd="slow" p14:dur="2000">
         <p159:morph option="byObject"/>
       </p:transition>
     </mc:Choice>
-    <mc:Fallback>
+    <mc:Fallback xmlns="">
       <p:transition spd="slow">
         <p:fade/>
       </p:transition>
@@ -35215,13 +35347,13 @@
   <p:clrMapOvr>
     <a:masterClrMapping/>
   </p:clrMapOvr>
-  <mc:AlternateContent xmlns:mc="http://schemas.openxmlformats.org/markup-compatibility/2006">
-    <mc:Choice xmlns:p159="http://schemas.microsoft.com/office/powerpoint/2015/09/main" Requires="p159">
+  <mc:AlternateContent xmlns:mc="http://schemas.openxmlformats.org/markup-compatibility/2006" xmlns:p159="http://schemas.microsoft.com/office/powerpoint/2015/09/main">
+    <mc:Choice Requires="p159">
       <p:transition xmlns:p14="http://schemas.microsoft.com/office/powerpoint/2010/main" spd="slow" p14:dur="2000">
         <p159:morph option="byObject"/>
       </p:transition>
     </mc:Choice>
-    <mc:Fallback>
+    <mc:Fallback xmlns="">
       <p:transition spd="slow">
         <p:fade/>
       </p:transition>

</xml_diff>